<commit_message>
remove all trailing whitescript with script
</commit_message>
<xml_diff>
--- a/docs/diagrams/StorageComponentClassDiagram.pptx
+++ b/docs/diagrams/StorageComponentClassDiagram.pptx
@@ -1,114 +1,3 @@
-
-<file path=ppt/presentation.xml><?xml version="1.0" encoding="utf-8"?>
-<p:presentation xmlns:a="http://schemas.openxmlformats.org/drawingml/2006/main" xmlns:r="http://schemas.openxmlformats.org/officeDocument/2006/relationships" xmlns:p="http://schemas.openxmlformats.org/presentationml/2006/main" saveSubsetFonts="1">
-  <p:sldMasterIdLst>
-    <p:sldMasterId id="2147483648" r:id="rId1"/>
-  </p:sldMasterIdLst>
-  <p:notesMasterIdLst>
-    <p:notesMasterId r:id="rId3"/>
-  </p:notesMasterIdLst>
-  <p:sldIdLst>
-    <p:sldId id="264" r:id="rId2"/>
-  </p:sldIdLst>
-  <p:sldSz cx="9144000" cy="6858000" type="screen4x3"/>
-  <p:notesSz cx="6858000" cy="9144000"/>
-  <p:defaultTextStyle>
-    <a:defPPr>
-      <a:defRPr lang="en-US"/>
-    </a:defPPr>
-    <a:lvl1pPr marL="0" algn="l" defTabSz="914400" rtl="0" eaLnBrk="1" latinLnBrk="0" hangingPunct="1">
-      <a:defRPr sz="1800" kern="1200">
-        <a:solidFill>
-          <a:schemeClr val="tx1"/>
-        </a:solidFill>
-        <a:latin typeface="+mn-lt"/>
-        <a:ea typeface="+mn-ea"/>
-        <a:cs typeface="+mn-cs"/>
-      </a:defRPr>
-    </a:lvl1pPr>
-    <a:lvl2pPr marL="457200" algn="l" defTabSz="914400" rtl="0" eaLnBrk="1" latinLnBrk="0" hangingPunct="1">
-      <a:defRPr sz="1800" kern="1200">
-        <a:solidFill>
-          <a:schemeClr val="tx1"/>
-        </a:solidFill>
-        <a:latin typeface="+mn-lt"/>
-        <a:ea typeface="+mn-ea"/>
-        <a:cs typeface="+mn-cs"/>
-      </a:defRPr>
-    </a:lvl2pPr>
-    <a:lvl3pPr marL="914400" algn="l" defTabSz="914400" rtl="0" eaLnBrk="1" latinLnBrk="0" hangingPunct="1">
-      <a:defRPr sz="1800" kern="1200">
-        <a:solidFill>
-          <a:schemeClr val="tx1"/>
-        </a:solidFill>
-        <a:latin typeface="+mn-lt"/>
-        <a:ea typeface="+mn-ea"/>
-        <a:cs typeface="+mn-cs"/>
-      </a:defRPr>
-    </a:lvl3pPr>
-    <a:lvl4pPr marL="1371600" algn="l" defTabSz="914400" rtl="0" eaLnBrk="1" latinLnBrk="0" hangingPunct="1">
-      <a:defRPr sz="1800" kern="1200">
-        <a:solidFill>
-          <a:schemeClr val="tx1"/>
-        </a:solidFill>
-        <a:latin typeface="+mn-lt"/>
-        <a:ea typeface="+mn-ea"/>
-        <a:cs typeface="+mn-cs"/>
-      </a:defRPr>
-    </a:lvl4pPr>
-    <a:lvl5pPr marL="1828800" algn="l" defTabSz="914400" rtl="0" eaLnBrk="1" latinLnBrk="0" hangingPunct="1">
-      <a:defRPr sz="1800" kern="1200">
-        <a:solidFill>
-          <a:schemeClr val="tx1"/>
-        </a:solidFill>
-        <a:latin typeface="+mn-lt"/>
-        <a:ea typeface="+mn-ea"/>
-        <a:cs typeface="+mn-cs"/>
-      </a:defRPr>
-    </a:lvl5pPr>
-    <a:lvl6pPr marL="2286000" algn="l" defTabSz="914400" rtl="0" eaLnBrk="1" latinLnBrk="0" hangingPunct="1">
-      <a:defRPr sz="1800" kern="1200">
-        <a:solidFill>
-          <a:schemeClr val="tx1"/>
-        </a:solidFill>
-        <a:latin typeface="+mn-lt"/>
-        <a:ea typeface="+mn-ea"/>
-        <a:cs typeface="+mn-cs"/>
-      </a:defRPr>
-    </a:lvl6pPr>
-    <a:lvl7pPr marL="2743200" algn="l" defTabSz="914400" rtl="0" eaLnBrk="1" latinLnBrk="0" hangingPunct="1">
-      <a:defRPr sz="1800" kern="1200">
-        <a:solidFill>
-          <a:schemeClr val="tx1"/>
-        </a:solidFill>
-        <a:latin typeface="+mn-lt"/>
-        <a:ea typeface="+mn-ea"/>
-        <a:cs typeface="+mn-cs"/>
-      </a:defRPr>
-    </a:lvl7pPr>
-    <a:lvl8pPr marL="3200400" algn="l" defTabSz="914400" rtl="0" eaLnBrk="1" latinLnBrk="0" hangingPunct="1">
-      <a:defRPr sz="1800" kern="1200">
-        <a:solidFill>
-          <a:schemeClr val="tx1"/>
-        </a:solidFill>
-        <a:latin typeface="+mn-lt"/>
-        <a:ea typeface="+mn-ea"/>
-        <a:cs typeface="+mn-cs"/>
-      </a:defRPr>
-    </a:lvl8pPr>
-    <a:lvl9pPr marL="3657600" algn="l" defTabSz="914400" rtl="0" eaLnBrk="1" latinLnBrk="0" hangingPunct="1">
-      <a:defRPr sz="1800" kern="1200">
-        <a:solidFill>
-          <a:schemeClr val="tx1"/>
-        </a:solidFill>
-        <a:latin typeface="+mn-lt"/>
-        <a:ea typeface="+mn-ea"/>
-        <a:cs typeface="+mn-cs"/>
-      </a:defRPr>
-    </a:lvl9pPr>
-  </p:defaultTextStyle>
-</p:presentation>
-</file>
 
 <file path=ppt/notesMasters/notesMaster1.xml><?xml version="1.0" encoding="utf-8"?>
 <p:notesMaster xmlns:a="http://schemas.openxmlformats.org/drawingml/2006/main" xmlns:r="http://schemas.openxmlformats.org/officeDocument/2006/relationships" xmlns:p="http://schemas.openxmlformats.org/presentationml/2006/main">
@@ -3429,1428 +3318,6 @@
     </p:otherStyle>
   </p:txStyles>
 </p:sldMaster>
-</file>
-
-<file path=ppt/slides/slide1.xml><?xml version="1.0" encoding="utf-8"?>
-<p:sld xmlns:a="http://schemas.openxmlformats.org/drawingml/2006/main" xmlns:r="http://schemas.openxmlformats.org/officeDocument/2006/relationships" xmlns:p="http://schemas.openxmlformats.org/presentationml/2006/main">
-  <p:cSld>
-    <p:spTree>
-      <p:nvGrpSpPr>
-        <p:cNvPr id="1" name=""/>
-        <p:cNvGrpSpPr/>
-        <p:nvPr/>
-      </p:nvGrpSpPr>
-      <p:grpSpPr>
-        <a:xfrm>
-          <a:off x="0" y="0"/>
-          <a:ext cx="0" cy="0"/>
-          <a:chOff x="0" y="0"/>
-          <a:chExt cx="0" cy="0"/>
-        </a:xfrm>
-      </p:grpSpPr>
-      <p:sp>
-        <p:nvSpPr>
-          <p:cNvPr id="118" name="Rectangle 65"/>
-          <p:cNvSpPr/>
-          <p:nvPr/>
-        </p:nvSpPr>
-        <p:spPr>
-          <a:xfrm>
-            <a:off x="1119865" y="2086382"/>
-            <a:ext cx="7871735" cy="1723618"/>
-          </a:xfrm>
-          <a:prstGeom prst="roundRect">
-            <a:avLst>
-              <a:gd name="adj" fmla="val 3484"/>
-            </a:avLst>
-          </a:prstGeom>
-          <a:solidFill>
-            <a:schemeClr val="accent6">
-              <a:lumMod val="20000"/>
-              <a:lumOff val="80000"/>
-            </a:schemeClr>
-          </a:solidFill>
-          <a:ln w="19050">
-            <a:noFill/>
-          </a:ln>
-          <a:effectLst/>
-        </p:spPr>
-        <p:style>
-          <a:lnRef idx="1">
-            <a:schemeClr val="accent2"/>
-          </a:lnRef>
-          <a:fillRef idx="2">
-            <a:schemeClr val="accent2"/>
-          </a:fillRef>
-          <a:effectRef idx="1">
-            <a:schemeClr val="accent2"/>
-          </a:effectRef>
-          <a:fontRef idx="minor">
-            <a:schemeClr val="dk1"/>
-          </a:fontRef>
-        </p:style>
-        <p:txBody>
-          <a:bodyPr rtlCol="0" anchor="t"/>
-          <a:lstStyle/>
-          <a:p>
-            <a:r>
-              <a:rPr lang="en-US" sz="1200" b="1" dirty="0" smtClean="0">
-                <a:solidFill>
-                  <a:schemeClr val="accent6">
-                    <a:lumMod val="75000"/>
-                  </a:schemeClr>
-                </a:solidFill>
-              </a:rPr>
-              <a:t>Storage</a:t>
-            </a:r>
-            <a:endParaRPr lang="en-SG" sz="1200" b="1" dirty="0">
-              <a:solidFill>
-                <a:schemeClr val="accent6">
-                  <a:lumMod val="75000"/>
-                </a:schemeClr>
-              </a:solidFill>
-            </a:endParaRPr>
-          </a:p>
-        </p:txBody>
-      </p:sp>
-      <p:sp>
-        <p:nvSpPr>
-          <p:cNvPr id="2" name="Rectangle 8"/>
-          <p:cNvSpPr/>
-          <p:nvPr/>
-        </p:nvSpPr>
-        <p:spPr>
-          <a:xfrm>
-            <a:off x="2877180" y="3158440"/>
-            <a:ext cx="1323049" cy="346760"/>
-          </a:xfrm>
-          <a:prstGeom prst="rect">
-            <a:avLst/>
-          </a:prstGeom>
-          <a:solidFill>
-            <a:schemeClr val="accent6">
-              <a:lumMod val="75000"/>
-            </a:schemeClr>
-          </a:solidFill>
-          <a:ln w="19050">
-            <a:solidFill>
-              <a:schemeClr val="accent6">
-                <a:lumMod val="75000"/>
-              </a:schemeClr>
-            </a:solidFill>
-          </a:ln>
-          <a:effectLst/>
-        </p:spPr>
-        <p:style>
-          <a:lnRef idx="1">
-            <a:schemeClr val="accent2"/>
-          </a:lnRef>
-          <a:fillRef idx="2">
-            <a:schemeClr val="accent2"/>
-          </a:fillRef>
-          <a:effectRef idx="1">
-            <a:schemeClr val="accent2"/>
-          </a:effectRef>
-          <a:fontRef idx="minor">
-            <a:schemeClr val="dk1"/>
-          </a:fontRef>
-        </p:style>
-        <p:txBody>
-          <a:bodyPr rtlCol="0" anchor="ctr"/>
-          <a:lstStyle/>
-          <a:p>
-            <a:pPr algn="ctr"/>
-            <a:r>
-              <a:rPr lang="en-US" sz="1050" dirty="0" smtClean="0">
-                <a:solidFill>
-                  <a:schemeClr val="bg1"/>
-                </a:solidFill>
-              </a:rPr>
-              <a:t>&lt;&lt;interface&gt;&gt;</a:t>
-            </a:r>
-            <a:br>
-              <a:rPr lang="en-US" sz="1050" dirty="0" smtClean="0">
-                <a:solidFill>
-                  <a:schemeClr val="bg1"/>
-                </a:solidFill>
-              </a:rPr>
-            </a:br>
-            <a:r>
-              <a:rPr lang="en-US" sz="1050" dirty="0" err="1" smtClean="0">
-                <a:solidFill>
-                  <a:schemeClr val="bg1"/>
-                </a:solidFill>
-              </a:rPr>
-              <a:t>AddressBookStorage</a:t>
-            </a:r>
-            <a:endParaRPr lang="en-SG" sz="1050" dirty="0">
-              <a:solidFill>
-                <a:schemeClr val="bg1"/>
-              </a:solidFill>
-            </a:endParaRPr>
-          </a:p>
-        </p:txBody>
-      </p:sp>
-      <p:sp>
-        <p:nvSpPr>
-          <p:cNvPr id="9" name="Rectangle 62"/>
-          <p:cNvSpPr/>
-          <p:nvPr/>
-        </p:nvSpPr>
-        <p:spPr>
-          <a:xfrm rot="16200000">
-            <a:off x="1683963" y="2868687"/>
-            <a:ext cx="1093635" cy="346760"/>
-          </a:xfrm>
-          <a:prstGeom prst="rect">
-            <a:avLst/>
-          </a:prstGeom>
-          <a:solidFill>
-            <a:schemeClr val="accent6">
-              <a:lumMod val="75000"/>
-            </a:schemeClr>
-          </a:solidFill>
-          <a:ln w="19050">
-            <a:solidFill>
-              <a:schemeClr val="accent6">
-                <a:lumMod val="75000"/>
-              </a:schemeClr>
-            </a:solidFill>
-          </a:ln>
-          <a:effectLst/>
-        </p:spPr>
-        <p:style>
-          <a:lnRef idx="1">
-            <a:schemeClr val="accent2"/>
-          </a:lnRef>
-          <a:fillRef idx="2">
-            <a:schemeClr val="accent2"/>
-          </a:fillRef>
-          <a:effectRef idx="1">
-            <a:schemeClr val="accent2"/>
-          </a:effectRef>
-          <a:fontRef idx="minor">
-            <a:schemeClr val="dk1"/>
-          </a:fontRef>
-        </p:style>
-        <p:txBody>
-          <a:bodyPr rtlCol="0" anchor="ctr"/>
-          <a:lstStyle/>
-          <a:p>
-            <a:pPr algn="ctr"/>
-            <a:r>
-              <a:rPr lang="en-US" sz="1050" dirty="0" err="1" smtClean="0">
-                <a:solidFill>
-                  <a:schemeClr val="bg1"/>
-                </a:solidFill>
-              </a:rPr>
-              <a:t>StorageManager</a:t>
-            </a:r>
-            <a:endParaRPr lang="en-SG" sz="1050" dirty="0">
-              <a:solidFill>
-                <a:schemeClr val="bg1"/>
-              </a:solidFill>
-            </a:endParaRPr>
-          </a:p>
-        </p:txBody>
-      </p:sp>
-      <p:sp>
-        <p:nvSpPr>
-          <p:cNvPr id="119" name="Rectangle 62"/>
-          <p:cNvSpPr/>
-          <p:nvPr/>
-        </p:nvSpPr>
-        <p:spPr>
-          <a:xfrm rot="16200000">
-            <a:off x="956202" y="2861202"/>
-            <a:ext cx="1093635" cy="346760"/>
-          </a:xfrm>
-          <a:prstGeom prst="rect">
-            <a:avLst/>
-          </a:prstGeom>
-          <a:solidFill>
-            <a:schemeClr val="accent6">
-              <a:lumMod val="75000"/>
-            </a:schemeClr>
-          </a:solidFill>
-          <a:ln w="19050">
-            <a:solidFill>
-              <a:schemeClr val="accent6">
-                <a:lumMod val="75000"/>
-              </a:schemeClr>
-            </a:solidFill>
-          </a:ln>
-          <a:effectLst/>
-        </p:spPr>
-        <p:style>
-          <a:lnRef idx="1">
-            <a:schemeClr val="accent2"/>
-          </a:lnRef>
-          <a:fillRef idx="2">
-            <a:schemeClr val="accent2"/>
-          </a:fillRef>
-          <a:effectRef idx="1">
-            <a:schemeClr val="accent2"/>
-          </a:effectRef>
-          <a:fontRef idx="minor">
-            <a:schemeClr val="dk1"/>
-          </a:fontRef>
-        </p:style>
-        <p:txBody>
-          <a:bodyPr rtlCol="0" anchor="ctr"/>
-          <a:lstStyle/>
-          <a:p>
-            <a:pPr algn="ctr"/>
-            <a:r>
-              <a:rPr lang="en-US" sz="1050" dirty="0">
-                <a:solidFill>
-                  <a:schemeClr val="bg1"/>
-                </a:solidFill>
-              </a:rPr>
-              <a:t>&lt;&lt;interface&gt;&gt;</a:t>
-            </a:r>
-          </a:p>
-          <a:p>
-            <a:pPr algn="ctr"/>
-            <a:r>
-              <a:rPr lang="en-US" sz="1050" dirty="0" smtClean="0">
-                <a:solidFill>
-                  <a:schemeClr val="bg1"/>
-                </a:solidFill>
-              </a:rPr>
-              <a:t>Storage</a:t>
-            </a:r>
-            <a:endParaRPr lang="en-SG" sz="1050" dirty="0">
-              <a:solidFill>
-                <a:schemeClr val="bg1"/>
-              </a:solidFill>
-            </a:endParaRPr>
-          </a:p>
-        </p:txBody>
-      </p:sp>
-      <p:sp>
-        <p:nvSpPr>
-          <p:cNvPr id="120" name="Isosceles Triangle 102"/>
-          <p:cNvSpPr/>
-          <p:nvPr/>
-        </p:nvSpPr>
-        <p:spPr>
-          <a:xfrm rot="16200000">
-            <a:off x="1626910" y="2952291"/>
-            <a:ext cx="270504" cy="175523"/>
-          </a:xfrm>
-          <a:prstGeom prst="triangle">
-            <a:avLst/>
-          </a:prstGeom>
-          <a:solidFill>
-            <a:schemeClr val="accent6">
-              <a:lumMod val="75000"/>
-            </a:schemeClr>
-          </a:solidFill>
-          <a:ln w="19050">
-            <a:solidFill>
-              <a:schemeClr val="accent6">
-                <a:lumMod val="75000"/>
-              </a:schemeClr>
-            </a:solidFill>
-          </a:ln>
-          <a:effectLst/>
-        </p:spPr>
-        <p:style>
-          <a:lnRef idx="1">
-            <a:schemeClr val="accent2"/>
-          </a:lnRef>
-          <a:fillRef idx="2">
-            <a:schemeClr val="accent2"/>
-          </a:fillRef>
-          <a:effectRef idx="1">
-            <a:schemeClr val="accent2"/>
-          </a:effectRef>
-          <a:fontRef idx="minor">
-            <a:schemeClr val="dk1"/>
-          </a:fontRef>
-        </p:style>
-        <p:txBody>
-          <a:bodyPr rtlCol="0" anchor="ctr"/>
-          <a:lstStyle/>
-          <a:p>
-            <a:pPr algn="ctr"/>
-            <a:endParaRPr lang="en-SG" sz="1050">
-              <a:solidFill>
-                <a:schemeClr val="bg1"/>
-              </a:solidFill>
-            </a:endParaRPr>
-          </a:p>
-        </p:txBody>
-      </p:sp>
-      <p:cxnSp>
-        <p:nvCxnSpPr>
-          <p:cNvPr id="58" name="Straight Arrow Connector 57"/>
-          <p:cNvCxnSpPr>
-            <a:stCxn id="42" idx="3"/>
-            <a:endCxn id="2" idx="1"/>
-          </p:cNvCxnSpPr>
-          <p:nvPr/>
-        </p:nvCxnSpPr>
-        <p:spPr>
-          <a:xfrm>
-            <a:off x="2656370" y="3326536"/>
-            <a:ext cx="220810" cy="5284"/>
-          </a:xfrm>
-          <a:prstGeom prst="straightConnector1">
-            <a:avLst/>
-          </a:prstGeom>
-          <a:ln w="19050">
-            <a:solidFill>
-              <a:schemeClr val="accent6">
-                <a:lumMod val="75000"/>
-              </a:schemeClr>
-            </a:solidFill>
-            <a:headEnd type="none" w="med" len="med"/>
-            <a:tailEnd type="arrow" w="med" len="med"/>
-          </a:ln>
-          <a:effectLst/>
-        </p:spPr>
-        <p:style>
-          <a:lnRef idx="1">
-            <a:schemeClr val="accent2"/>
-          </a:lnRef>
-          <a:fillRef idx="2">
-            <a:schemeClr val="accent2"/>
-          </a:fillRef>
-          <a:effectRef idx="1">
-            <a:schemeClr val="accent2"/>
-          </a:effectRef>
-          <a:fontRef idx="minor">
-            <a:schemeClr val="dk1"/>
-          </a:fontRef>
-        </p:style>
-      </p:cxnSp>
-      <p:cxnSp>
-        <p:nvCxnSpPr>
-          <p:cNvPr id="75" name="Elbow Connector 122"/>
-          <p:cNvCxnSpPr/>
-          <p:nvPr/>
-        </p:nvCxnSpPr>
-        <p:spPr>
-          <a:xfrm>
-            <a:off x="910091" y="3040053"/>
-            <a:ext cx="419548" cy="2860"/>
-          </a:xfrm>
-          <a:prstGeom prst="bentConnector3">
-            <a:avLst>
-              <a:gd name="adj1" fmla="val 50000"/>
-            </a:avLst>
-          </a:prstGeom>
-          <a:ln w="19050">
-            <a:solidFill>
-              <a:schemeClr val="bg1">
-                <a:lumMod val="75000"/>
-              </a:schemeClr>
-            </a:solidFill>
-            <a:prstDash val="sysDot"/>
-            <a:headEnd type="none" w="med" len="med"/>
-            <a:tailEnd type="arrow" w="med" len="med"/>
-          </a:ln>
-          <a:effectLst/>
-        </p:spPr>
-        <p:style>
-          <a:lnRef idx="1">
-            <a:schemeClr val="accent2"/>
-          </a:lnRef>
-          <a:fillRef idx="2">
-            <a:schemeClr val="accent2"/>
-          </a:fillRef>
-          <a:effectRef idx="1">
-            <a:schemeClr val="accent2"/>
-          </a:effectRef>
-          <a:fontRef idx="minor">
-            <a:schemeClr val="dk1"/>
-          </a:fontRef>
-        </p:style>
-      </p:cxnSp>
-      <p:cxnSp>
-        <p:nvCxnSpPr>
-          <p:cNvPr id="21" name="Straight Connector 20"/>
-          <p:cNvCxnSpPr>
-            <a:stCxn id="120" idx="3"/>
-          </p:cNvCxnSpPr>
-          <p:nvPr/>
-        </p:nvCxnSpPr>
-        <p:spPr>
-          <a:xfrm flipV="1">
-            <a:off x="1849924" y="3040052"/>
-            <a:ext cx="216105" cy="1"/>
-          </a:xfrm>
-          <a:prstGeom prst="line">
-            <a:avLst/>
-          </a:prstGeom>
-          <a:ln w="19050">
-            <a:solidFill>
-              <a:schemeClr val="accent6">
-                <a:lumMod val="75000"/>
-              </a:schemeClr>
-            </a:solidFill>
-            <a:prstDash val="sysDot"/>
-            <a:headEnd type="none" w="med" len="med"/>
-            <a:tailEnd type="none" w="med" len="med"/>
-          </a:ln>
-          <a:effectLst/>
-        </p:spPr>
-        <p:style>
-          <a:lnRef idx="1">
-            <a:schemeClr val="accent2"/>
-          </a:lnRef>
-          <a:fillRef idx="2">
-            <a:schemeClr val="accent2"/>
-          </a:fillRef>
-          <a:effectRef idx="1">
-            <a:schemeClr val="accent2"/>
-          </a:effectRef>
-          <a:fontRef idx="minor">
-            <a:schemeClr val="dk1"/>
-          </a:fontRef>
-        </p:style>
-      </p:cxnSp>
-      <p:sp>
-        <p:nvSpPr>
-          <p:cNvPr id="42" name="Flowchart: Decision 96"/>
-          <p:cNvSpPr/>
-          <p:nvPr/>
-        </p:nvSpPr>
-        <p:spPr>
-          <a:xfrm>
-            <a:off x="2420322" y="3239846"/>
-            <a:ext cx="236048" cy="173380"/>
-          </a:xfrm>
-          <a:prstGeom prst="flowChartDecision">
-            <a:avLst/>
-          </a:prstGeom>
-          <a:noFill/>
-          <a:ln w="19050">
-            <a:solidFill>
-              <a:schemeClr val="accent6">
-                <a:lumMod val="75000"/>
-              </a:schemeClr>
-            </a:solidFill>
-          </a:ln>
-          <a:effectLst/>
-        </p:spPr>
-        <p:style>
-          <a:lnRef idx="1">
-            <a:schemeClr val="accent2"/>
-          </a:lnRef>
-          <a:fillRef idx="2">
-            <a:schemeClr val="accent2"/>
-          </a:fillRef>
-          <a:effectRef idx="1">
-            <a:schemeClr val="accent2"/>
-          </a:effectRef>
-          <a:fontRef idx="minor">
-            <a:schemeClr val="dk1"/>
-          </a:fontRef>
-        </p:style>
-        <p:txBody>
-          <a:bodyPr rtlCol="0" anchor="ctr"/>
-          <a:lstStyle/>
-          <a:p>
-            <a:pPr algn="ctr"/>
-            <a:endParaRPr lang="en-US" sz="1050">
-              <a:solidFill>
-                <a:schemeClr val="bg1"/>
-              </a:solidFill>
-            </a:endParaRPr>
-          </a:p>
-        </p:txBody>
-      </p:sp>
-      <p:cxnSp>
-        <p:nvCxnSpPr>
-          <p:cNvPr id="97" name="Elbow Connector 63"/>
-          <p:cNvCxnSpPr>
-            <a:stCxn id="99" idx="3"/>
-            <a:endCxn id="50" idx="1"/>
-          </p:cNvCxnSpPr>
-          <p:nvPr/>
-        </p:nvCxnSpPr>
-        <p:spPr>
-          <a:xfrm flipV="1">
-            <a:off x="4398041" y="3331820"/>
-            <a:ext cx="223324" cy="1"/>
-          </a:xfrm>
-          <a:prstGeom prst="bentConnector3">
-            <a:avLst>
-              <a:gd name="adj1" fmla="val 50000"/>
-            </a:avLst>
-          </a:prstGeom>
-          <a:ln w="19050">
-            <a:solidFill>
-              <a:schemeClr val="accent6">
-                <a:lumMod val="75000"/>
-              </a:schemeClr>
-            </a:solidFill>
-            <a:prstDash val="sysDot"/>
-            <a:headEnd type="none" w="med" len="med"/>
-            <a:tailEnd type="none" w="med" len="med"/>
-          </a:ln>
-          <a:effectLst/>
-        </p:spPr>
-        <p:style>
-          <a:lnRef idx="1">
-            <a:schemeClr val="accent2"/>
-          </a:lnRef>
-          <a:fillRef idx="2">
-            <a:schemeClr val="accent2"/>
-          </a:fillRef>
-          <a:effectRef idx="1">
-            <a:schemeClr val="accent2"/>
-          </a:effectRef>
-          <a:fontRef idx="minor">
-            <a:schemeClr val="dk1"/>
-          </a:fontRef>
-        </p:style>
-      </p:cxnSp>
-      <p:sp>
-        <p:nvSpPr>
-          <p:cNvPr id="99" name="Isosceles Triangle 102"/>
-          <p:cNvSpPr/>
-          <p:nvPr/>
-        </p:nvSpPr>
-        <p:spPr>
-          <a:xfrm rot="5400000" flipV="1">
-            <a:off x="4175027" y="3244059"/>
-            <a:ext cx="270504" cy="175523"/>
-          </a:xfrm>
-          <a:prstGeom prst="triangle">
-            <a:avLst/>
-          </a:prstGeom>
-          <a:solidFill>
-            <a:schemeClr val="accent6">
-              <a:lumMod val="75000"/>
-            </a:schemeClr>
-          </a:solidFill>
-          <a:ln w="19050">
-            <a:solidFill>
-              <a:schemeClr val="accent6">
-                <a:lumMod val="75000"/>
-              </a:schemeClr>
-            </a:solidFill>
-          </a:ln>
-          <a:effectLst/>
-        </p:spPr>
-        <p:style>
-          <a:lnRef idx="1">
-            <a:schemeClr val="accent2"/>
-          </a:lnRef>
-          <a:fillRef idx="2">
-            <a:schemeClr val="accent2"/>
-          </a:fillRef>
-          <a:effectRef idx="1">
-            <a:schemeClr val="accent2"/>
-          </a:effectRef>
-          <a:fontRef idx="minor">
-            <a:schemeClr val="dk1"/>
-          </a:fontRef>
-        </p:style>
-        <p:txBody>
-          <a:bodyPr rtlCol="0" anchor="ctr"/>
-          <a:lstStyle/>
-          <a:p>
-            <a:pPr algn="ctr"/>
-            <a:endParaRPr lang="en-SG" sz="1050">
-              <a:solidFill>
-                <a:schemeClr val="bg1"/>
-              </a:solidFill>
-            </a:endParaRPr>
-          </a:p>
-        </p:txBody>
-      </p:sp>
-      <p:cxnSp>
-        <p:nvCxnSpPr>
-          <p:cNvPr id="124" name="Elbow Connector 122"/>
-          <p:cNvCxnSpPr>
-            <a:stCxn id="50" idx="3"/>
-            <a:endCxn id="66" idx="1"/>
-          </p:cNvCxnSpPr>
-          <p:nvPr/>
-        </p:nvCxnSpPr>
-        <p:spPr>
-          <a:xfrm>
-            <a:off x="5791200" y="3331820"/>
-            <a:ext cx="228600" cy="1970"/>
-          </a:xfrm>
-          <a:prstGeom prst="bentConnector3">
-            <a:avLst>
-              <a:gd name="adj1" fmla="val 50000"/>
-            </a:avLst>
-          </a:prstGeom>
-          <a:ln w="19050">
-            <a:solidFill>
-              <a:schemeClr val="accent6">
-                <a:lumMod val="75000"/>
-              </a:schemeClr>
-            </a:solidFill>
-            <a:prstDash val="sysDot"/>
-            <a:headEnd type="none" w="med" len="med"/>
-            <a:tailEnd type="arrow" w="med" len="med"/>
-          </a:ln>
-          <a:effectLst/>
-        </p:spPr>
-        <p:style>
-          <a:lnRef idx="1">
-            <a:schemeClr val="accent2"/>
-          </a:lnRef>
-          <a:fillRef idx="2">
-            <a:schemeClr val="accent2"/>
-          </a:fillRef>
-          <a:effectRef idx="1">
-            <a:schemeClr val="accent2"/>
-          </a:effectRef>
-          <a:fontRef idx="minor">
-            <a:schemeClr val="dk1"/>
-          </a:fontRef>
-        </p:style>
-      </p:cxnSp>
-      <p:sp>
-        <p:nvSpPr>
-          <p:cNvPr id="50" name="Rectangle 8"/>
-          <p:cNvSpPr/>
-          <p:nvPr/>
-        </p:nvSpPr>
-        <p:spPr>
-          <a:xfrm>
-            <a:off x="4621365" y="3158440"/>
-            <a:ext cx="1169835" cy="346760"/>
-          </a:xfrm>
-          <a:prstGeom prst="rect">
-            <a:avLst/>
-          </a:prstGeom>
-          <a:ln w="19050"/>
-          <a:effectLst/>
-        </p:spPr>
-        <p:style>
-          <a:lnRef idx="1">
-            <a:schemeClr val="accent6"/>
-          </a:lnRef>
-          <a:fillRef idx="2">
-            <a:schemeClr val="accent6"/>
-          </a:fillRef>
-          <a:effectRef idx="1">
-            <a:schemeClr val="accent6"/>
-          </a:effectRef>
-          <a:fontRef idx="minor">
-            <a:schemeClr val="dk1"/>
-          </a:fontRef>
-        </p:style>
-        <p:txBody>
-          <a:bodyPr rtlCol="0" anchor="ctr"/>
-          <a:lstStyle/>
-          <a:p>
-            <a:pPr algn="ctr"/>
-            <a:r>
-              <a:rPr lang="en-US" sz="1050" b="1" dirty="0" err="1" smtClean="0">
-                <a:solidFill>
-                  <a:schemeClr val="accent6">
-                    <a:lumMod val="75000"/>
-                  </a:schemeClr>
-                </a:solidFill>
-              </a:rPr>
-              <a:t>XmlAddressBook</a:t>
-            </a:r>
-            <a:r>
-              <a:rPr lang="en-US" sz="1050" b="1" dirty="0" smtClean="0">
-                <a:solidFill>
-                  <a:schemeClr val="accent6">
-                    <a:lumMod val="75000"/>
-                  </a:schemeClr>
-                </a:solidFill>
-              </a:rPr>
-              <a:t/>
-            </a:r>
-            <a:br>
-              <a:rPr lang="en-US" sz="1050" b="1" dirty="0" smtClean="0">
-                <a:solidFill>
-                  <a:schemeClr val="accent6">
-                    <a:lumMod val="75000"/>
-                  </a:schemeClr>
-                </a:solidFill>
-              </a:rPr>
-            </a:br>
-            <a:r>
-              <a:rPr lang="en-US" sz="1050" b="1" dirty="0" smtClean="0">
-                <a:solidFill>
-                  <a:schemeClr val="accent6">
-                    <a:lumMod val="75000"/>
-                  </a:schemeClr>
-                </a:solidFill>
-              </a:rPr>
-              <a:t>Storage</a:t>
-            </a:r>
-            <a:endParaRPr lang="en-SG" sz="1050" b="1" dirty="0">
-              <a:solidFill>
-                <a:schemeClr val="accent6">
-                  <a:lumMod val="75000"/>
-                </a:schemeClr>
-              </a:solidFill>
-            </a:endParaRPr>
-          </a:p>
-        </p:txBody>
-      </p:sp>
-      <p:sp>
-        <p:nvSpPr>
-          <p:cNvPr id="52" name="Rectangle 8"/>
-          <p:cNvSpPr/>
-          <p:nvPr/>
-        </p:nvSpPr>
-        <p:spPr>
-          <a:xfrm>
-            <a:off x="2873943" y="2558040"/>
-            <a:ext cx="1323049" cy="346760"/>
-          </a:xfrm>
-          <a:prstGeom prst="rect">
-            <a:avLst/>
-          </a:prstGeom>
-          <a:solidFill>
-            <a:schemeClr val="accent6">
-              <a:lumMod val="75000"/>
-            </a:schemeClr>
-          </a:solidFill>
-          <a:ln w="19050">
-            <a:solidFill>
-              <a:schemeClr val="accent6">
-                <a:lumMod val="75000"/>
-              </a:schemeClr>
-            </a:solidFill>
-          </a:ln>
-          <a:effectLst/>
-        </p:spPr>
-        <p:style>
-          <a:lnRef idx="1">
-            <a:schemeClr val="accent2"/>
-          </a:lnRef>
-          <a:fillRef idx="2">
-            <a:schemeClr val="accent2"/>
-          </a:fillRef>
-          <a:effectRef idx="1">
-            <a:schemeClr val="accent2"/>
-          </a:effectRef>
-          <a:fontRef idx="minor">
-            <a:schemeClr val="dk1"/>
-          </a:fontRef>
-        </p:style>
-        <p:txBody>
-          <a:bodyPr rtlCol="0" anchor="ctr"/>
-          <a:lstStyle/>
-          <a:p>
-            <a:pPr algn="ctr"/>
-            <a:r>
-              <a:rPr lang="en-US" sz="1050" dirty="0" smtClean="0">
-                <a:solidFill>
-                  <a:schemeClr val="bg1"/>
-                </a:solidFill>
-              </a:rPr>
-              <a:t>&lt;&lt;interface&gt;&gt;</a:t>
-            </a:r>
-            <a:br>
-              <a:rPr lang="en-US" sz="1050" dirty="0" smtClean="0">
-                <a:solidFill>
-                  <a:schemeClr val="bg1"/>
-                </a:solidFill>
-              </a:rPr>
-            </a:br>
-            <a:r>
-              <a:rPr lang="en-US" sz="1050" dirty="0" err="1" smtClean="0">
-                <a:solidFill>
-                  <a:schemeClr val="bg1"/>
-                </a:solidFill>
-              </a:rPr>
-              <a:t>UserPrefsStorage</a:t>
-            </a:r>
-            <a:endParaRPr lang="en-SG" sz="1050" dirty="0">
-              <a:solidFill>
-                <a:schemeClr val="bg1"/>
-              </a:solidFill>
-            </a:endParaRPr>
-          </a:p>
-        </p:txBody>
-      </p:sp>
-      <p:cxnSp>
-        <p:nvCxnSpPr>
-          <p:cNvPr id="54" name="Straight Arrow Connector 53"/>
-          <p:cNvCxnSpPr>
-            <a:stCxn id="56" idx="3"/>
-            <a:endCxn id="52" idx="1"/>
-          </p:cNvCxnSpPr>
-          <p:nvPr/>
-        </p:nvCxnSpPr>
-        <p:spPr>
-          <a:xfrm>
-            <a:off x="2653133" y="2726136"/>
-            <a:ext cx="220810" cy="5284"/>
-          </a:xfrm>
-          <a:prstGeom prst="straightConnector1">
-            <a:avLst/>
-          </a:prstGeom>
-          <a:ln w="19050">
-            <a:solidFill>
-              <a:schemeClr val="accent6">
-                <a:lumMod val="75000"/>
-              </a:schemeClr>
-            </a:solidFill>
-            <a:headEnd type="none" w="med" len="med"/>
-            <a:tailEnd type="arrow" w="med" len="med"/>
-          </a:ln>
-          <a:effectLst/>
-        </p:spPr>
-        <p:style>
-          <a:lnRef idx="1">
-            <a:schemeClr val="accent2"/>
-          </a:lnRef>
-          <a:fillRef idx="2">
-            <a:schemeClr val="accent2"/>
-          </a:fillRef>
-          <a:effectRef idx="1">
-            <a:schemeClr val="accent2"/>
-          </a:effectRef>
-          <a:fontRef idx="minor">
-            <a:schemeClr val="dk1"/>
-          </a:fontRef>
-        </p:style>
-      </p:cxnSp>
-      <p:sp>
-        <p:nvSpPr>
-          <p:cNvPr id="56" name="Flowchart: Decision 96"/>
-          <p:cNvSpPr/>
-          <p:nvPr/>
-        </p:nvSpPr>
-        <p:spPr>
-          <a:xfrm>
-            <a:off x="2417085" y="2639446"/>
-            <a:ext cx="236048" cy="173380"/>
-          </a:xfrm>
-          <a:prstGeom prst="flowChartDecision">
-            <a:avLst/>
-          </a:prstGeom>
-          <a:noFill/>
-          <a:ln w="19050">
-            <a:solidFill>
-              <a:schemeClr val="accent6">
-                <a:lumMod val="75000"/>
-              </a:schemeClr>
-            </a:solidFill>
-          </a:ln>
-          <a:effectLst/>
-        </p:spPr>
-        <p:style>
-          <a:lnRef idx="1">
-            <a:schemeClr val="accent2"/>
-          </a:lnRef>
-          <a:fillRef idx="2">
-            <a:schemeClr val="accent2"/>
-          </a:fillRef>
-          <a:effectRef idx="1">
-            <a:schemeClr val="accent2"/>
-          </a:effectRef>
-          <a:fontRef idx="minor">
-            <a:schemeClr val="dk1"/>
-          </a:fontRef>
-        </p:style>
-        <p:txBody>
-          <a:bodyPr rtlCol="0" anchor="ctr"/>
-          <a:lstStyle/>
-          <a:p>
-            <a:pPr algn="ctr"/>
-            <a:endParaRPr lang="en-US" sz="1050">
-              <a:solidFill>
-                <a:schemeClr val="bg1"/>
-              </a:solidFill>
-            </a:endParaRPr>
-          </a:p>
-        </p:txBody>
-      </p:sp>
-      <p:cxnSp>
-        <p:nvCxnSpPr>
-          <p:cNvPr id="60" name="Elbow Connector 63"/>
-          <p:cNvCxnSpPr>
-            <a:stCxn id="61" idx="3"/>
-            <a:endCxn id="65" idx="1"/>
-          </p:cNvCxnSpPr>
-          <p:nvPr/>
-        </p:nvCxnSpPr>
-        <p:spPr>
-          <a:xfrm flipV="1">
-            <a:off x="4394804" y="2731420"/>
-            <a:ext cx="223324" cy="1"/>
-          </a:xfrm>
-          <a:prstGeom prst="bentConnector3">
-            <a:avLst>
-              <a:gd name="adj1" fmla="val 50000"/>
-            </a:avLst>
-          </a:prstGeom>
-          <a:ln w="19050">
-            <a:solidFill>
-              <a:schemeClr val="accent6">
-                <a:lumMod val="75000"/>
-              </a:schemeClr>
-            </a:solidFill>
-            <a:prstDash val="sysDot"/>
-            <a:headEnd type="none" w="med" len="med"/>
-            <a:tailEnd type="none" w="med" len="med"/>
-          </a:ln>
-          <a:effectLst/>
-        </p:spPr>
-        <p:style>
-          <a:lnRef idx="1">
-            <a:schemeClr val="accent2"/>
-          </a:lnRef>
-          <a:fillRef idx="2">
-            <a:schemeClr val="accent2"/>
-          </a:fillRef>
-          <a:effectRef idx="1">
-            <a:schemeClr val="accent2"/>
-          </a:effectRef>
-          <a:fontRef idx="minor">
-            <a:schemeClr val="dk1"/>
-          </a:fontRef>
-        </p:style>
-      </p:cxnSp>
-      <p:sp>
-        <p:nvSpPr>
-          <p:cNvPr id="61" name="Isosceles Triangle 102"/>
-          <p:cNvSpPr/>
-          <p:nvPr/>
-        </p:nvSpPr>
-        <p:spPr>
-          <a:xfrm rot="5400000" flipV="1">
-            <a:off x="4171790" y="2643659"/>
-            <a:ext cx="270504" cy="175523"/>
-          </a:xfrm>
-          <a:prstGeom prst="triangle">
-            <a:avLst/>
-          </a:prstGeom>
-          <a:solidFill>
-            <a:schemeClr val="accent6">
-              <a:lumMod val="75000"/>
-            </a:schemeClr>
-          </a:solidFill>
-          <a:ln w="19050">
-            <a:solidFill>
-              <a:schemeClr val="accent6">
-                <a:lumMod val="75000"/>
-              </a:schemeClr>
-            </a:solidFill>
-          </a:ln>
-          <a:effectLst/>
-        </p:spPr>
-        <p:style>
-          <a:lnRef idx="1">
-            <a:schemeClr val="accent2"/>
-          </a:lnRef>
-          <a:fillRef idx="2">
-            <a:schemeClr val="accent2"/>
-          </a:fillRef>
-          <a:effectRef idx="1">
-            <a:schemeClr val="accent2"/>
-          </a:effectRef>
-          <a:fontRef idx="minor">
-            <a:schemeClr val="dk1"/>
-          </a:fontRef>
-        </p:style>
-        <p:txBody>
-          <a:bodyPr rtlCol="0" anchor="ctr"/>
-          <a:lstStyle/>
-          <a:p>
-            <a:pPr algn="ctr"/>
-            <a:endParaRPr lang="en-SG" sz="1050">
-              <a:solidFill>
-                <a:schemeClr val="bg1"/>
-              </a:solidFill>
-            </a:endParaRPr>
-          </a:p>
-        </p:txBody>
-      </p:sp>
-      <p:sp>
-        <p:nvSpPr>
-          <p:cNvPr id="65" name="Rectangle 8"/>
-          <p:cNvSpPr/>
-          <p:nvPr/>
-        </p:nvSpPr>
-        <p:spPr>
-          <a:xfrm>
-            <a:off x="4618128" y="2558040"/>
-            <a:ext cx="1093635" cy="346760"/>
-          </a:xfrm>
-          <a:prstGeom prst="rect">
-            <a:avLst/>
-          </a:prstGeom>
-          <a:solidFill>
-            <a:schemeClr val="accent6">
-              <a:lumMod val="75000"/>
-            </a:schemeClr>
-          </a:solidFill>
-          <a:ln w="19050">
-            <a:solidFill>
-              <a:schemeClr val="accent6">
-                <a:lumMod val="75000"/>
-              </a:schemeClr>
-            </a:solidFill>
-          </a:ln>
-          <a:effectLst/>
-        </p:spPr>
-        <p:style>
-          <a:lnRef idx="1">
-            <a:schemeClr val="accent2"/>
-          </a:lnRef>
-          <a:fillRef idx="2">
-            <a:schemeClr val="accent2"/>
-          </a:fillRef>
-          <a:effectRef idx="1">
-            <a:schemeClr val="accent2"/>
-          </a:effectRef>
-          <a:fontRef idx="minor">
-            <a:schemeClr val="dk1"/>
-          </a:fontRef>
-        </p:style>
-        <p:txBody>
-          <a:bodyPr rtlCol="0" anchor="ctr"/>
-          <a:lstStyle/>
-          <a:p>
-            <a:pPr algn="ctr"/>
-            <a:r>
-              <a:rPr lang="en-US" sz="1050" dirty="0" err="1" smtClean="0">
-                <a:solidFill>
-                  <a:schemeClr val="bg1"/>
-                </a:solidFill>
-              </a:rPr>
-              <a:t>JsonUserPrefs</a:t>
-            </a:r>
-            <a:r>
-              <a:rPr lang="en-US" sz="1050" dirty="0" smtClean="0">
-                <a:solidFill>
-                  <a:schemeClr val="bg1"/>
-                </a:solidFill>
-              </a:rPr>
-              <a:t/>
-            </a:r>
-            <a:br>
-              <a:rPr lang="en-US" sz="1050" dirty="0" smtClean="0">
-                <a:solidFill>
-                  <a:schemeClr val="bg1"/>
-                </a:solidFill>
-              </a:rPr>
-            </a:br>
-            <a:r>
-              <a:rPr lang="en-US" sz="1050" dirty="0" smtClean="0">
-                <a:solidFill>
-                  <a:schemeClr val="bg1"/>
-                </a:solidFill>
-              </a:rPr>
-              <a:t>Storage</a:t>
-            </a:r>
-            <a:endParaRPr lang="en-SG" sz="1050" dirty="0">
-              <a:solidFill>
-                <a:schemeClr val="bg1"/>
-              </a:solidFill>
-            </a:endParaRPr>
-          </a:p>
-        </p:txBody>
-      </p:sp>
-      <p:sp>
-        <p:nvSpPr>
-          <p:cNvPr id="66" name="Rectangle 8"/>
-          <p:cNvSpPr/>
-          <p:nvPr/>
-        </p:nvSpPr>
-        <p:spPr>
-          <a:xfrm>
-            <a:off x="6019800" y="3160410"/>
-            <a:ext cx="1200707" cy="346760"/>
-          </a:xfrm>
-          <a:prstGeom prst="rect">
-            <a:avLst/>
-          </a:prstGeom>
-          <a:ln w="19050"/>
-          <a:effectLst/>
-        </p:spPr>
-        <p:style>
-          <a:lnRef idx="1">
-            <a:schemeClr val="accent6"/>
-          </a:lnRef>
-          <a:fillRef idx="2">
-            <a:schemeClr val="accent6"/>
-          </a:fillRef>
-          <a:effectRef idx="1">
-            <a:schemeClr val="accent6"/>
-          </a:effectRef>
-          <a:fontRef idx="minor">
-            <a:schemeClr val="dk1"/>
-          </a:fontRef>
-        </p:style>
-        <p:txBody>
-          <a:bodyPr rtlCol="0" anchor="ctr"/>
-          <a:lstStyle/>
-          <a:p>
-            <a:pPr algn="ctr"/>
-            <a:r>
-              <a:rPr lang="en-US" sz="1050" b="1" dirty="0" err="1" smtClean="0">
-                <a:solidFill>
-                  <a:schemeClr val="accent6">
-                    <a:lumMod val="75000"/>
-                  </a:schemeClr>
-                </a:solidFill>
-              </a:rPr>
-              <a:t>XmlSerializable</a:t>
-            </a:r>
-            <a:r>
-              <a:rPr lang="en-US" sz="1050" b="1" dirty="0" smtClean="0">
-                <a:solidFill>
-                  <a:schemeClr val="accent6">
-                    <a:lumMod val="75000"/>
-                  </a:schemeClr>
-                </a:solidFill>
-              </a:rPr>
-              <a:t/>
-            </a:r>
-            <a:br>
-              <a:rPr lang="en-US" sz="1050" b="1" dirty="0" smtClean="0">
-                <a:solidFill>
-                  <a:schemeClr val="accent6">
-                    <a:lumMod val="75000"/>
-                  </a:schemeClr>
-                </a:solidFill>
-              </a:rPr>
-            </a:br>
-            <a:r>
-              <a:rPr lang="en-US" sz="1050" b="1" dirty="0" err="1" smtClean="0">
-                <a:solidFill>
-                  <a:schemeClr val="accent6">
-                    <a:lumMod val="75000"/>
-                  </a:schemeClr>
-                </a:solidFill>
-              </a:rPr>
-              <a:t>AddressBook</a:t>
-            </a:r>
-            <a:endParaRPr lang="en-SG" sz="1050" b="1" dirty="0">
-              <a:solidFill>
-                <a:schemeClr val="accent6">
-                  <a:lumMod val="75000"/>
-                </a:schemeClr>
-              </a:solidFill>
-            </a:endParaRPr>
-          </a:p>
-        </p:txBody>
-      </p:sp>
-      <p:cxnSp>
-        <p:nvCxnSpPr>
-          <p:cNvPr id="70" name="Elbow Connector 122"/>
-          <p:cNvCxnSpPr>
-            <a:stCxn id="74" idx="0"/>
-            <a:endCxn id="73" idx="2"/>
-          </p:cNvCxnSpPr>
-          <p:nvPr/>
-        </p:nvCxnSpPr>
-        <p:spPr>
-          <a:xfrm rot="5400000" flipH="1" flipV="1">
-            <a:off x="8077993" y="2992020"/>
-            <a:ext cx="335208" cy="12700"/>
-          </a:xfrm>
-          <a:prstGeom prst="bentConnector3">
-            <a:avLst>
-              <a:gd name="adj1" fmla="val 50000"/>
-            </a:avLst>
-          </a:prstGeom>
-          <a:ln w="19050">
-            <a:prstDash val="sysDot"/>
-            <a:headEnd type="none" w="med" len="med"/>
-            <a:tailEnd type="arrow" w="med" len="med"/>
-          </a:ln>
-          <a:effectLst/>
-        </p:spPr>
-        <p:style>
-          <a:lnRef idx="1">
-            <a:schemeClr val="accent6"/>
-          </a:lnRef>
-          <a:fillRef idx="2">
-            <a:schemeClr val="accent6"/>
-          </a:fillRef>
-          <a:effectRef idx="1">
-            <a:schemeClr val="accent6"/>
-          </a:effectRef>
-          <a:fontRef idx="minor">
-            <a:schemeClr val="dk1"/>
-          </a:fontRef>
-        </p:style>
-      </p:cxnSp>
-      <p:sp>
-        <p:nvSpPr>
-          <p:cNvPr id="73" name="Rectangle 8"/>
-          <p:cNvSpPr/>
-          <p:nvPr/>
-        </p:nvSpPr>
-        <p:spPr>
-          <a:xfrm>
-            <a:off x="7615738" y="2477656"/>
-            <a:ext cx="1259718" cy="346760"/>
-          </a:xfrm>
-          <a:prstGeom prst="rect">
-            <a:avLst/>
-          </a:prstGeom>
-          <a:ln w="19050"/>
-          <a:effectLst/>
-        </p:spPr>
-        <p:style>
-          <a:lnRef idx="1">
-            <a:schemeClr val="accent6"/>
-          </a:lnRef>
-          <a:fillRef idx="2">
-            <a:schemeClr val="accent6"/>
-          </a:fillRef>
-          <a:effectRef idx="1">
-            <a:schemeClr val="accent6"/>
-          </a:effectRef>
-          <a:fontRef idx="minor">
-            <a:schemeClr val="dk1"/>
-          </a:fontRef>
-        </p:style>
-        <p:txBody>
-          <a:bodyPr rtlCol="0" anchor="ctr"/>
-          <a:lstStyle/>
-          <a:p>
-            <a:pPr algn="ctr"/>
-            <a:r>
-              <a:rPr lang="en-US" sz="1050" b="1" dirty="0" err="1" smtClean="0">
-                <a:solidFill>
-                  <a:schemeClr val="accent6">
-                    <a:lumMod val="75000"/>
-                  </a:schemeClr>
-                </a:solidFill>
-              </a:rPr>
-              <a:t>XmlAdaptedTag</a:t>
-            </a:r>
-            <a:endParaRPr lang="en-SG" sz="1050" b="1" dirty="0">
-              <a:solidFill>
-                <a:schemeClr val="accent6">
-                  <a:lumMod val="75000"/>
-                </a:schemeClr>
-              </a:solidFill>
-            </a:endParaRPr>
-          </a:p>
-        </p:txBody>
-      </p:sp>
-      <p:sp>
-        <p:nvSpPr>
-          <p:cNvPr id="74" name="Rectangle 8"/>
-          <p:cNvSpPr/>
-          <p:nvPr/>
-        </p:nvSpPr>
-        <p:spPr>
-          <a:xfrm>
-            <a:off x="7615738" y="3159624"/>
-            <a:ext cx="1259718" cy="346760"/>
-          </a:xfrm>
-          <a:prstGeom prst="rect">
-            <a:avLst/>
-          </a:prstGeom>
-          <a:ln w="19050"/>
-          <a:effectLst/>
-        </p:spPr>
-        <p:style>
-          <a:lnRef idx="1">
-            <a:schemeClr val="accent6"/>
-          </a:lnRef>
-          <a:fillRef idx="2">
-            <a:schemeClr val="accent6"/>
-          </a:fillRef>
-          <a:effectRef idx="1">
-            <a:schemeClr val="accent6"/>
-          </a:effectRef>
-          <a:fontRef idx="minor">
-            <a:schemeClr val="dk1"/>
-          </a:fontRef>
-        </p:style>
-        <p:txBody>
-          <a:bodyPr rtlCol="0" anchor="ctr"/>
-          <a:lstStyle/>
-          <a:p>
-            <a:pPr algn="ctr"/>
-            <a:r>
-              <a:rPr lang="en-US" sz="1050" b="1" dirty="0" err="1" smtClean="0">
-                <a:solidFill>
-                  <a:schemeClr val="accent6">
-                    <a:lumMod val="75000"/>
-                  </a:schemeClr>
-                </a:solidFill>
-              </a:rPr>
-              <a:t>XmlAdaptedPerson</a:t>
-            </a:r>
-            <a:endParaRPr lang="en-SG" sz="1050" b="1" dirty="0">
-              <a:solidFill>
-                <a:schemeClr val="accent6">
-                  <a:lumMod val="75000"/>
-                </a:schemeClr>
-              </a:solidFill>
-            </a:endParaRPr>
-          </a:p>
-        </p:txBody>
-      </p:sp>
-      <p:cxnSp>
-        <p:nvCxnSpPr>
-          <p:cNvPr id="77" name="Elbow Connector 122"/>
-          <p:cNvCxnSpPr>
-            <a:stCxn id="66" idx="3"/>
-            <a:endCxn id="74" idx="1"/>
-          </p:cNvCxnSpPr>
-          <p:nvPr/>
-        </p:nvCxnSpPr>
-        <p:spPr>
-          <a:xfrm flipV="1">
-            <a:off x="7220507" y="3333004"/>
-            <a:ext cx="395231" cy="786"/>
-          </a:xfrm>
-          <a:prstGeom prst="bentConnector3">
-            <a:avLst>
-              <a:gd name="adj1" fmla="val 50000"/>
-            </a:avLst>
-          </a:prstGeom>
-          <a:ln w="19050">
-            <a:prstDash val="sysDot"/>
-            <a:headEnd type="none" w="med" len="med"/>
-            <a:tailEnd type="arrow" w="med" len="med"/>
-          </a:ln>
-          <a:effectLst/>
-        </p:spPr>
-        <p:style>
-          <a:lnRef idx="1">
-            <a:schemeClr val="accent6"/>
-          </a:lnRef>
-          <a:fillRef idx="2">
-            <a:schemeClr val="accent6"/>
-          </a:fillRef>
-          <a:effectRef idx="1">
-            <a:schemeClr val="accent6"/>
-          </a:effectRef>
-          <a:fontRef idx="minor">
-            <a:schemeClr val="dk1"/>
-          </a:fontRef>
-        </p:style>
-      </p:cxnSp>
-    </p:spTree>
-    <p:extLst>
-      <p:ext uri="{BB962C8B-B14F-4D97-AF65-F5344CB8AC3E}">
-        <p14:creationId xmlns:p14="http://schemas.microsoft.com/office/powerpoint/2010/main" val="1478832369"/>
-      </p:ext>
-    </p:extLst>
-  </p:cSld>
-  <p:clrMapOvr>
-    <a:masterClrMapping/>
-  </p:clrMapOvr>
-  <p:timing>
-    <p:tnLst>
-      <p:par>
-        <p:cTn id="1" dur="indefinite" restart="never" nodeType="tmRoot"/>
-      </p:par>
-    </p:tnLst>
-  </p:timing>
-</p:sld>
 </file>
 
 <file path=ppt/theme/theme1.xml><?xml version="1.0" encoding="utf-8"?>

</xml_diff>